<commit_message>
Final seminar 1 slides.
</commit_message>
<xml_diff>
--- a/docproject/PFMS Smartskies Presentation Semester 1.pptx
+++ b/docproject/PFMS Smartskies Presentation Semester 1.pptx
@@ -5,7 +5,7 @@
     <p:sldMasterId id="2147483648" r:id="rId1"/>
   </p:sldMasterIdLst>
   <p:notesMasterIdLst>
-    <p:notesMasterId r:id="rId23"/>
+    <p:notesMasterId r:id="rId22"/>
   </p:notesMasterIdLst>
   <p:sldIdLst>
     <p:sldId id="274" r:id="rId2"/>
@@ -13,11 +13,11 @@
     <p:sldId id="276" r:id="rId4"/>
     <p:sldId id="257" r:id="rId5"/>
     <p:sldId id="258" r:id="rId6"/>
-    <p:sldId id="279" r:id="rId7"/>
-    <p:sldId id="259" r:id="rId8"/>
-    <p:sldId id="280" r:id="rId9"/>
-    <p:sldId id="264" r:id="rId10"/>
-    <p:sldId id="260" r:id="rId11"/>
+    <p:sldId id="259" r:id="rId7"/>
+    <p:sldId id="280" r:id="rId8"/>
+    <p:sldId id="264" r:id="rId9"/>
+    <p:sldId id="260" r:id="rId10"/>
+    <p:sldId id="282" r:id="rId11"/>
     <p:sldId id="265" r:id="rId12"/>
     <p:sldId id="267" r:id="rId13"/>
     <p:sldId id="268" r:id="rId14"/>
@@ -28,7 +28,6 @@
     <p:sldId id="269" r:id="rId19"/>
     <p:sldId id="270" r:id="rId20"/>
     <p:sldId id="271" r:id="rId21"/>
-    <p:sldId id="278" r:id="rId22"/>
   </p:sldIdLst>
   <p:sldSz cx="9144000" cy="6858000" type="screen4x3"/>
   <p:notesSz cx="6858000" cy="9144000"/>
@@ -1265,10 +1264,24 @@
     <dgm:pt modelId="{466940E3-EA6A-42DC-95A3-5E4EE200E6DD}" type="pres">
       <dgm:prSet presAssocID="{49A9375E-CCA4-4E4A-9BA7-50BA552724E9}" presName="sibTrans" presStyleLbl="sibTrans2D1" presStyleIdx="0" presStyleCnt="3"/>
       <dgm:spPr/>
+      <dgm:t>
+        <a:bodyPr/>
+        <a:lstStyle/>
+        <a:p>
+          <a:endParaRPr lang="en-AU"/>
+        </a:p>
+      </dgm:t>
     </dgm:pt>
     <dgm:pt modelId="{D54E16DE-697B-4E35-BF10-1530BA6E5CB1}" type="pres">
       <dgm:prSet presAssocID="{49A9375E-CCA4-4E4A-9BA7-50BA552724E9}" presName="connectorText" presStyleLbl="sibTrans2D1" presStyleIdx="0" presStyleCnt="3"/>
       <dgm:spPr/>
+      <dgm:t>
+        <a:bodyPr/>
+        <a:lstStyle/>
+        <a:p>
+          <a:endParaRPr lang="en-AU"/>
+        </a:p>
+      </dgm:t>
     </dgm:pt>
     <dgm:pt modelId="{24C4A362-B06F-414B-ADEE-63CF2ADA0169}" type="pres">
       <dgm:prSet presAssocID="{38E8A24F-D48C-4672-9FEC-405CD7FF7AB7}" presName="node" presStyleLbl="node1" presStyleIdx="1" presStyleCnt="4">
@@ -1288,10 +1301,24 @@
     <dgm:pt modelId="{01A15108-7EEB-4D44-9843-E50B56D0EDA2}" type="pres">
       <dgm:prSet presAssocID="{B86B56B5-200D-44BA-9F73-C5E28579F1B2}" presName="sibTrans" presStyleLbl="sibTrans2D1" presStyleIdx="1" presStyleCnt="3"/>
       <dgm:spPr/>
+      <dgm:t>
+        <a:bodyPr/>
+        <a:lstStyle/>
+        <a:p>
+          <a:endParaRPr lang="en-AU"/>
+        </a:p>
+      </dgm:t>
     </dgm:pt>
     <dgm:pt modelId="{B41B84E2-57A5-4B2D-85AC-E307298248C0}" type="pres">
       <dgm:prSet presAssocID="{B86B56B5-200D-44BA-9F73-C5E28579F1B2}" presName="connectorText" presStyleLbl="sibTrans2D1" presStyleIdx="1" presStyleCnt="3"/>
       <dgm:spPr/>
+      <dgm:t>
+        <a:bodyPr/>
+        <a:lstStyle/>
+        <a:p>
+          <a:endParaRPr lang="en-AU"/>
+        </a:p>
+      </dgm:t>
     </dgm:pt>
     <dgm:pt modelId="{D637E2F0-B3F4-410A-A86F-1CBEB1FDA3DD}" type="pres">
       <dgm:prSet presAssocID="{27FD279B-4475-4639-897B-4FC26EB6F3EF}" presName="node" presStyleLbl="node1" presStyleIdx="2" presStyleCnt="4">
@@ -1311,10 +1338,24 @@
     <dgm:pt modelId="{561699BC-813B-4CD3-BC2C-125017980F12}" type="pres">
       <dgm:prSet presAssocID="{48906FF7-615A-46AF-9BE2-E3558D16041B}" presName="sibTrans" presStyleLbl="sibTrans2D1" presStyleIdx="2" presStyleCnt="3"/>
       <dgm:spPr/>
+      <dgm:t>
+        <a:bodyPr/>
+        <a:lstStyle/>
+        <a:p>
+          <a:endParaRPr lang="en-AU"/>
+        </a:p>
+      </dgm:t>
     </dgm:pt>
     <dgm:pt modelId="{D028C623-DF73-49F0-92ED-5AD4A513974B}" type="pres">
       <dgm:prSet presAssocID="{48906FF7-615A-46AF-9BE2-E3558D16041B}" presName="connectorText" presStyleLbl="sibTrans2D1" presStyleIdx="2" presStyleCnt="3"/>
       <dgm:spPr/>
+      <dgm:t>
+        <a:bodyPr/>
+        <a:lstStyle/>
+        <a:p>
+          <a:endParaRPr lang="en-AU"/>
+        </a:p>
+      </dgm:t>
     </dgm:pt>
     <dgm:pt modelId="{0D92213F-F40C-42DB-938C-9595938BC88E}" type="pres">
       <dgm:prSet presAssocID="{D3EBB73C-E248-4BD4-8001-403EE5E1FAA8}" presName="node" presStyleLbl="node1" presStyleIdx="3" presStyleCnt="4">
@@ -1333,21 +1374,21 @@
     </dgm:pt>
   </dgm:ptLst>
   <dgm:cxnLst>
+    <dgm:cxn modelId="{31B3A5E5-9438-43A2-BE55-9CA6E8F8E31C}" type="presOf" srcId="{48906FF7-615A-46AF-9BE2-E3558D16041B}" destId="{D028C623-DF73-49F0-92ED-5AD4A513974B}" srcOrd="1" destOrd="0" presId="urn:microsoft.com/office/officeart/2005/8/layout/process2"/>
+    <dgm:cxn modelId="{E9509821-1400-4170-9DF6-50D432216EB3}" type="presOf" srcId="{38E8A24F-D48C-4672-9FEC-405CD7FF7AB7}" destId="{24C4A362-B06F-414B-ADEE-63CF2ADA0169}" srcOrd="0" destOrd="0" presId="urn:microsoft.com/office/officeart/2005/8/layout/process2"/>
+    <dgm:cxn modelId="{DC38DF5D-A039-4125-BDF5-C695315B2AD5}" type="presOf" srcId="{48906FF7-615A-46AF-9BE2-E3558D16041B}" destId="{561699BC-813B-4CD3-BC2C-125017980F12}" srcOrd="0" destOrd="0" presId="urn:microsoft.com/office/officeart/2005/8/layout/process2"/>
+    <dgm:cxn modelId="{8BC662E4-9FDE-4100-B6CE-E39D1A1A6745}" type="presOf" srcId="{49A9375E-CCA4-4E4A-9BA7-50BA552724E9}" destId="{466940E3-EA6A-42DC-95A3-5E4EE200E6DD}" srcOrd="0" destOrd="0" presId="urn:microsoft.com/office/officeart/2005/8/layout/process2"/>
+    <dgm:cxn modelId="{1B6E36C5-A856-49B2-9419-35F6348AB5BB}" type="presOf" srcId="{B86B56B5-200D-44BA-9F73-C5E28579F1B2}" destId="{01A15108-7EEB-4D44-9843-E50B56D0EDA2}" srcOrd="0" destOrd="0" presId="urn:microsoft.com/office/officeart/2005/8/layout/process2"/>
     <dgm:cxn modelId="{1FDC279D-B722-4D0B-A754-BA666B7439DC}" type="presOf" srcId="{B86B56B5-200D-44BA-9F73-C5E28579F1B2}" destId="{B41B84E2-57A5-4B2D-85AC-E307298248C0}" srcOrd="1" destOrd="0" presId="urn:microsoft.com/office/officeart/2005/8/layout/process2"/>
+    <dgm:cxn modelId="{FBD99760-3C0D-4060-B51E-CDDE7ED70EF3}" type="presOf" srcId="{49A9375E-CCA4-4E4A-9BA7-50BA552724E9}" destId="{D54E16DE-697B-4E35-BF10-1530BA6E5CB1}" srcOrd="1" destOrd="0" presId="urn:microsoft.com/office/officeart/2005/8/layout/process2"/>
+    <dgm:cxn modelId="{FE71541C-6737-412F-8DA3-17C8479D1BD7}" type="presOf" srcId="{34A36129-7D75-4ACD-9AE0-60243EEC3087}" destId="{89450E8D-3284-47B3-A416-65FDBC0F66CB}" srcOrd="0" destOrd="0" presId="urn:microsoft.com/office/officeart/2005/8/layout/process2"/>
+    <dgm:cxn modelId="{1CF2B01B-C043-45A6-A7B1-80718D74C2B9}" type="presOf" srcId="{D3EBB73C-E248-4BD4-8001-403EE5E1FAA8}" destId="{0D92213F-F40C-42DB-938C-9595938BC88E}" srcOrd="0" destOrd="0" presId="urn:microsoft.com/office/officeart/2005/8/layout/process2"/>
+    <dgm:cxn modelId="{32E3ABB6-E3C1-4BF8-AB87-9968BCC1B1C1}" srcId="{34A36129-7D75-4ACD-9AE0-60243EEC3087}" destId="{D3EBB73C-E248-4BD4-8001-403EE5E1FAA8}" srcOrd="3" destOrd="0" parTransId="{321E9C06-5C91-462A-9058-DC94816A2034}" sibTransId="{9EF0E200-0758-49AD-87DE-E2FF883C60E1}"/>
+    <dgm:cxn modelId="{55023507-4F18-42B0-841C-6DA6D2A92EEB}" srcId="{34A36129-7D75-4ACD-9AE0-60243EEC3087}" destId="{27FD279B-4475-4639-897B-4FC26EB6F3EF}" srcOrd="2" destOrd="0" parTransId="{FFF35ED6-940B-451B-9FEC-5E3EB08D7E93}" sibTransId="{48906FF7-615A-46AF-9BE2-E3558D16041B}"/>
+    <dgm:cxn modelId="{8562BAE8-E166-47EE-A148-17A06E2FC599}" type="presOf" srcId="{DE4AD8AB-3343-4AA7-9391-000999368BD0}" destId="{54E4F9EA-4470-4E4C-B041-BBC0C67C5B1F}" srcOrd="0" destOrd="0" presId="urn:microsoft.com/office/officeart/2005/8/layout/process2"/>
+    <dgm:cxn modelId="{1A4DA247-7928-4F26-8810-A45A25316F79}" srcId="{34A36129-7D75-4ACD-9AE0-60243EEC3087}" destId="{DE4AD8AB-3343-4AA7-9391-000999368BD0}" srcOrd="0" destOrd="0" parTransId="{16BB91F0-511A-47B5-9F6D-A58CD2937DD0}" sibTransId="{49A9375E-CCA4-4E4A-9BA7-50BA552724E9}"/>
+    <dgm:cxn modelId="{1A5089A5-0A73-49DE-B9BC-E9E25F7B8383}" type="presOf" srcId="{27FD279B-4475-4639-897B-4FC26EB6F3EF}" destId="{D637E2F0-B3F4-410A-A86F-1CBEB1FDA3DD}" srcOrd="0" destOrd="0" presId="urn:microsoft.com/office/officeart/2005/8/layout/process2"/>
     <dgm:cxn modelId="{2D77343F-067C-4629-AA33-EC1C8D10E7FE}" srcId="{34A36129-7D75-4ACD-9AE0-60243EEC3087}" destId="{38E8A24F-D48C-4672-9FEC-405CD7FF7AB7}" srcOrd="1" destOrd="0" parTransId="{751AED92-E6A2-496F-A41E-D7ECB36C7F4E}" sibTransId="{B86B56B5-200D-44BA-9F73-C5E28579F1B2}"/>
-    <dgm:cxn modelId="{DC38DF5D-A039-4125-BDF5-C695315B2AD5}" type="presOf" srcId="{48906FF7-615A-46AF-9BE2-E3558D16041B}" destId="{561699BC-813B-4CD3-BC2C-125017980F12}" srcOrd="0" destOrd="0" presId="urn:microsoft.com/office/officeart/2005/8/layout/process2"/>
-    <dgm:cxn modelId="{55023507-4F18-42B0-841C-6DA6D2A92EEB}" srcId="{34A36129-7D75-4ACD-9AE0-60243EEC3087}" destId="{27FD279B-4475-4639-897B-4FC26EB6F3EF}" srcOrd="2" destOrd="0" parTransId="{FFF35ED6-940B-451B-9FEC-5E3EB08D7E93}" sibTransId="{48906FF7-615A-46AF-9BE2-E3558D16041B}"/>
-    <dgm:cxn modelId="{1A4DA247-7928-4F26-8810-A45A25316F79}" srcId="{34A36129-7D75-4ACD-9AE0-60243EEC3087}" destId="{DE4AD8AB-3343-4AA7-9391-000999368BD0}" srcOrd="0" destOrd="0" parTransId="{16BB91F0-511A-47B5-9F6D-A58CD2937DD0}" sibTransId="{49A9375E-CCA4-4E4A-9BA7-50BA552724E9}"/>
-    <dgm:cxn modelId="{32E3ABB6-E3C1-4BF8-AB87-9968BCC1B1C1}" srcId="{34A36129-7D75-4ACD-9AE0-60243EEC3087}" destId="{D3EBB73C-E248-4BD4-8001-403EE5E1FAA8}" srcOrd="3" destOrd="0" parTransId="{321E9C06-5C91-462A-9058-DC94816A2034}" sibTransId="{9EF0E200-0758-49AD-87DE-E2FF883C60E1}"/>
-    <dgm:cxn modelId="{FBD99760-3C0D-4060-B51E-CDDE7ED70EF3}" type="presOf" srcId="{49A9375E-CCA4-4E4A-9BA7-50BA552724E9}" destId="{D54E16DE-697B-4E35-BF10-1530BA6E5CB1}" srcOrd="1" destOrd="0" presId="urn:microsoft.com/office/officeart/2005/8/layout/process2"/>
-    <dgm:cxn modelId="{31B3A5E5-9438-43A2-BE55-9CA6E8F8E31C}" type="presOf" srcId="{48906FF7-615A-46AF-9BE2-E3558D16041B}" destId="{D028C623-DF73-49F0-92ED-5AD4A513974B}" srcOrd="1" destOrd="0" presId="urn:microsoft.com/office/officeart/2005/8/layout/process2"/>
-    <dgm:cxn modelId="{8BC662E4-9FDE-4100-B6CE-E39D1A1A6745}" type="presOf" srcId="{49A9375E-CCA4-4E4A-9BA7-50BA552724E9}" destId="{466940E3-EA6A-42DC-95A3-5E4EE200E6DD}" srcOrd="0" destOrd="0" presId="urn:microsoft.com/office/officeart/2005/8/layout/process2"/>
-    <dgm:cxn modelId="{1A5089A5-0A73-49DE-B9BC-E9E25F7B8383}" type="presOf" srcId="{27FD279B-4475-4639-897B-4FC26EB6F3EF}" destId="{D637E2F0-B3F4-410A-A86F-1CBEB1FDA3DD}" srcOrd="0" destOrd="0" presId="urn:microsoft.com/office/officeart/2005/8/layout/process2"/>
-    <dgm:cxn modelId="{1CF2B01B-C043-45A6-A7B1-80718D74C2B9}" type="presOf" srcId="{D3EBB73C-E248-4BD4-8001-403EE5E1FAA8}" destId="{0D92213F-F40C-42DB-938C-9595938BC88E}" srcOrd="0" destOrd="0" presId="urn:microsoft.com/office/officeart/2005/8/layout/process2"/>
-    <dgm:cxn modelId="{1B6E36C5-A856-49B2-9419-35F6348AB5BB}" type="presOf" srcId="{B86B56B5-200D-44BA-9F73-C5E28579F1B2}" destId="{01A15108-7EEB-4D44-9843-E50B56D0EDA2}" srcOrd="0" destOrd="0" presId="urn:microsoft.com/office/officeart/2005/8/layout/process2"/>
-    <dgm:cxn modelId="{FE71541C-6737-412F-8DA3-17C8479D1BD7}" type="presOf" srcId="{34A36129-7D75-4ACD-9AE0-60243EEC3087}" destId="{89450E8D-3284-47B3-A416-65FDBC0F66CB}" srcOrd="0" destOrd="0" presId="urn:microsoft.com/office/officeart/2005/8/layout/process2"/>
-    <dgm:cxn modelId="{E9509821-1400-4170-9DF6-50D432216EB3}" type="presOf" srcId="{38E8A24F-D48C-4672-9FEC-405CD7FF7AB7}" destId="{24C4A362-B06F-414B-ADEE-63CF2ADA0169}" srcOrd="0" destOrd="0" presId="urn:microsoft.com/office/officeart/2005/8/layout/process2"/>
-    <dgm:cxn modelId="{8562BAE8-E166-47EE-A148-17A06E2FC599}" type="presOf" srcId="{DE4AD8AB-3343-4AA7-9391-000999368BD0}" destId="{54E4F9EA-4470-4E4C-B041-BBC0C67C5B1F}" srcOrd="0" destOrd="0" presId="urn:microsoft.com/office/officeart/2005/8/layout/process2"/>
     <dgm:cxn modelId="{F7A4FB48-D31F-46E9-A8ED-4F3AE7D345D1}" type="presParOf" srcId="{89450E8D-3284-47B3-A416-65FDBC0F66CB}" destId="{54E4F9EA-4470-4E4C-B041-BBC0C67C5B1F}" srcOrd="0" destOrd="0" presId="urn:microsoft.com/office/officeart/2005/8/layout/process2"/>
     <dgm:cxn modelId="{1D66ACD8-B94D-48BA-9084-F2E058036E8F}" type="presParOf" srcId="{89450E8D-3284-47B3-A416-65FDBC0F66CB}" destId="{466940E3-EA6A-42DC-95A3-5E4EE200E6DD}" srcOrd="1" destOrd="0" presId="urn:microsoft.com/office/officeart/2005/8/layout/process2"/>
     <dgm:cxn modelId="{B7E91906-31BB-4C23-8163-B4C84C1B9DB6}" type="presParOf" srcId="{466940E3-EA6A-42DC-95A3-5E4EE200E6DD}" destId="{D54E16DE-697B-4E35-BF10-1530BA6E5CB1}" srcOrd="0" destOrd="0" presId="urn:microsoft.com/office/officeart/2005/8/layout/process2"/>
@@ -6577,131 +6618,14 @@
           <a:lstStyle/>
           <a:p>
             <a:r>
-              <a:rPr lang="en-AU" sz="4000" b="0" u="none" dirty="0" smtClean="0"/>
-              <a:t>Project Budget &amp; Risks</a:t>
-            </a:r>
-            <a:endParaRPr lang="en-AU" sz="4000" b="0" u="none" dirty="0"/>
-          </a:p>
-        </p:txBody>
-      </p:sp>
-      <p:sp>
-        <p:nvSpPr>
-          <p:cNvPr id="3" name="Content Placeholder 2"/>
-          <p:cNvSpPr>
-            <a:spLocks noGrp="1"/>
-          </p:cNvSpPr>
-          <p:nvPr>
-            <p:ph idx="1"/>
-          </p:nvPr>
-        </p:nvSpPr>
-        <p:spPr/>
-        <p:txBody>
-          <a:bodyPr/>
-          <a:lstStyle/>
-          <a:p>
-            <a:pPr>
-              <a:buClr>
-                <a:srgbClr val="0070C0"/>
-              </a:buClr>
-              <a:buFont typeface="Wingdings" pitchFamily="2" charset="2"/>
-              <a:buChar char="q"/>
-            </a:pPr>
-            <a:r>
-              <a:rPr lang="en-AU" dirty="0" smtClean="0"/>
-              <a:t>Project Budget</a:t>
-            </a:r>
-          </a:p>
-          <a:p>
-            <a:pPr lvl="1">
-              <a:buClr>
-                <a:srgbClr val="0070C0"/>
-              </a:buClr>
-              <a:buFont typeface="Wingdings" pitchFamily="2" charset="2"/>
-              <a:buChar char="Ø"/>
-            </a:pPr>
-            <a:r>
-              <a:rPr lang="en-AU" dirty="0" smtClean="0"/>
-              <a:t>No incurred costs for software development.</a:t>
-            </a:r>
-          </a:p>
-          <a:p>
-            <a:pPr lvl="1">
-              <a:buClr>
-                <a:srgbClr val="0070C0"/>
-              </a:buClr>
-              <a:buFont typeface="Wingdings" pitchFamily="2" charset="2"/>
-              <a:buChar char="Ø"/>
-            </a:pPr>
-            <a:r>
-              <a:rPr lang="en-AU" dirty="0" smtClean="0"/>
-              <a:t>Future Costs will be covered by the QUAS project.</a:t>
-            </a:r>
-          </a:p>
-          <a:p>
-            <a:pPr>
-              <a:buClr>
-                <a:srgbClr val="0070C0"/>
-              </a:buClr>
-              <a:buFont typeface="Wingdings" pitchFamily="2" charset="2"/>
-              <a:buChar char="q"/>
-            </a:pPr>
-            <a:r>
-              <a:rPr lang="en-AU" dirty="0" smtClean="0"/>
-              <a:t>Project </a:t>
-            </a:r>
-            <a:r>
-              <a:rPr lang="en-AU" dirty="0" smtClean="0"/>
-              <a:t>Risks</a:t>
-            </a:r>
-          </a:p>
-          <a:p>
-            <a:pPr lvl="1">
-              <a:buClr>
-                <a:srgbClr val="0070C0"/>
-              </a:buClr>
-              <a:buFont typeface="Wingdings" pitchFamily="2" charset="2"/>
-              <a:buChar char="Ø"/>
-            </a:pPr>
-            <a:r>
-              <a:rPr lang="en-AU" dirty="0" smtClean="0"/>
-              <a:t>Risk Management Plan.</a:t>
-            </a:r>
-          </a:p>
-          <a:p>
-            <a:pPr lvl="1">
-              <a:buClr>
-                <a:srgbClr val="0070C0"/>
-              </a:buClr>
-              <a:buFont typeface="Wingdings" pitchFamily="2" charset="2"/>
-              <a:buChar char="Ø"/>
-            </a:pPr>
-            <a:r>
-              <a:rPr lang="en-AU" dirty="0" smtClean="0"/>
-              <a:t>Single Working Engineer.</a:t>
-            </a:r>
-          </a:p>
-          <a:p>
-            <a:pPr lvl="1">
-              <a:buClr>
-                <a:srgbClr val="0070C0"/>
-              </a:buClr>
-              <a:buFont typeface="Wingdings" pitchFamily="2" charset="2"/>
-              <a:buChar char="Ø"/>
-            </a:pPr>
-            <a:r>
-              <a:rPr lang="en-AU" dirty="0" smtClean="0"/>
-              <a:t>Possible complex control methods and high level of coding proficiency.</a:t>
-            </a:r>
-          </a:p>
-          <a:p>
-            <a:pPr lvl="1">
-              <a:buClr>
-                <a:srgbClr val="0070C0"/>
-              </a:buClr>
-              <a:buFont typeface="Wingdings" pitchFamily="2" charset="2"/>
-              <a:buChar char="Ø"/>
-            </a:pPr>
-            <a:endParaRPr lang="en-AU" dirty="0" smtClean="0"/>
+              <a:rPr lang="en-AU" sz="3600" b="0" u="none" dirty="0" smtClean="0"/>
+              <a:t>System </a:t>
+            </a:r>
+            <a:r>
+              <a:rPr lang="en-AU" sz="3600" b="0" u="none" dirty="0" smtClean="0"/>
+              <a:t>Architecture of PFMS</a:t>
+            </a:r>
+            <a:endParaRPr lang="en-AU" sz="3600" b="0" u="none" dirty="0" smtClean="0"/>
           </a:p>
         </p:txBody>
       </p:sp>
@@ -6752,18 +6676,69 @@
           </a:p>
         </p:txBody>
       </p:sp>
+      <p:sp>
+        <p:nvSpPr>
+          <p:cNvPr id="56322" name="Rectangle 2"/>
+          <p:cNvSpPr>
+            <a:spLocks noChangeArrowheads="1"/>
+          </p:cNvSpPr>
+          <p:nvPr/>
+        </p:nvSpPr>
+        <p:spPr bwMode="auto">
+          <a:xfrm>
+            <a:off x="0" y="0"/>
+            <a:ext cx="9144000" cy="0"/>
+          </a:xfrm>
+          <a:prstGeom prst="rect">
+            <a:avLst/>
+          </a:prstGeom>
+          <a:noFill/>
+          <a:ln w="9525">
+            <a:noFill/>
+            <a:miter lim="800000"/>
+            <a:headEnd/>
+            <a:tailEnd/>
+          </a:ln>
+          <a:effectLst/>
+        </p:spPr>
+        <p:txBody>
+          <a:bodyPr vert="horz" wrap="none" lIns="91440" tIns="45720" rIns="91440" bIns="45720" numCol="1" anchor="ctr" anchorCtr="0" compatLnSpc="1">
+            <a:prstTxWarp prst="textNoShape">
+              <a:avLst/>
+            </a:prstTxWarp>
+            <a:spAutoFit/>
+          </a:bodyPr>
+          <a:lstStyle/>
+          <a:p>
+            <a:endParaRPr lang="en-AU"/>
+          </a:p>
+        </p:txBody>
+      </p:sp>
+      <p:graphicFrame>
+        <p:nvGraphicFramePr>
+          <p:cNvPr id="56321" name="Object 1"/>
+          <p:cNvGraphicFramePr>
+            <a:graphicFrameLocks noChangeAspect="1"/>
+          </p:cNvGraphicFramePr>
+          <p:nvPr/>
+        </p:nvGraphicFramePr>
+        <p:xfrm>
+          <a:off x="857224" y="1500174"/>
+          <a:ext cx="7486702" cy="3643338"/>
+        </p:xfrm>
+        <a:graphic>
+          <a:graphicData uri="http://schemas.openxmlformats.org/presentationml/2006/ole">
+            <p:oleObj spid="_x0000_s56321" name="Visio" r:id="rId3" imgW="4981522" imgH="2428672" progId="Visio.Drawing.11">
+              <p:embed/>
+            </p:oleObj>
+          </a:graphicData>
+        </a:graphic>
+      </p:graphicFrame>
     </p:spTree>
   </p:cSld>
   <p:clrMapOvr>
     <a:masterClrMapping/>
   </p:clrMapOvr>
-  <p:timing>
-    <p:tnLst>
-      <p:par>
-        <p:cTn id="1" dur="indefinite" restart="never" nodeType="tmRoot"/>
-      </p:par>
-    </p:tnLst>
-  </p:timing>
 </p:sld>
 </file>
 
@@ -6799,11 +6774,16 @@
           <a:bodyPr/>
           <a:lstStyle/>
           <a:p>
+            <a:pPr marL="400050"/>
             <a:r>
               <a:rPr lang="en-AU" sz="3600" b="0" u="none" dirty="0" smtClean="0"/>
-              <a:t>PFMS Models</a:t>
-            </a:r>
-            <a:endParaRPr lang="en-AU" sz="3600" b="0" u="none" dirty="0"/>
+              <a:t>3 </a:t>
+            </a:r>
+            <a:r>
+              <a:rPr lang="en-AU" sz="3600" b="0" u="none" dirty="0" smtClean="0"/>
+              <a:t>DOF Vehicle Dynamics Model</a:t>
+            </a:r>
+            <a:endParaRPr lang="en-AU" sz="3600" dirty="0" smtClean="0"/>
           </a:p>
         </p:txBody>
       </p:sp>
@@ -6822,7 +6802,7 @@
           <a:bodyPr/>
           <a:lstStyle/>
           <a:p>
-            <a:pPr marL="400050">
+            <a:pPr>
               <a:buClr>
                 <a:srgbClr val="0070C0"/>
               </a:buClr>
@@ -6830,60 +6810,51 @@
               <a:buChar char="q"/>
             </a:pPr>
             <a:r>
+              <a:rPr lang="en-AU" dirty="0" err="1" smtClean="0"/>
+              <a:t>Matlab</a:t>
+            </a:r>
+            <a:r>
               <a:rPr lang="en-AU" dirty="0" smtClean="0"/>
-              <a:t>Three Degree of Freedom Model</a:t>
-            </a:r>
-          </a:p>
-          <a:p>
-            <a:pPr lvl="1">
+              <a:t> </a:t>
+            </a:r>
+            <a:r>
+              <a:rPr lang="en-AU" dirty="0" smtClean="0"/>
+              <a:t>used for implementation.</a:t>
+            </a:r>
+          </a:p>
+          <a:p>
+            <a:pPr>
               <a:buClr>
                 <a:srgbClr val="0070C0"/>
               </a:buClr>
               <a:buFont typeface="Wingdings" pitchFamily="2" charset="2"/>
-              <a:buChar char="Ø"/>
+              <a:buChar char="q"/>
             </a:pPr>
             <a:r>
-              <a:rPr lang="en-AU" dirty="0" err="1" smtClean="0"/>
-              <a:t>Matlab</a:t>
-            </a:r>
-            <a:r>
               <a:rPr lang="en-AU" dirty="0" smtClean="0"/>
-              <a:t> used for implementation.</a:t>
-            </a:r>
-          </a:p>
-          <a:p>
-            <a:pPr lvl="1">
+              <a:t>Lacking multiple waypoint considerations.</a:t>
+            </a:r>
+          </a:p>
+          <a:p>
+            <a:pPr>
               <a:buClr>
                 <a:srgbClr val="0070C0"/>
               </a:buClr>
               <a:buFont typeface="Wingdings" pitchFamily="2" charset="2"/>
-              <a:buChar char="Ø"/>
+              <a:buChar char="q"/>
             </a:pPr>
             <a:r>
               <a:rPr lang="en-AU" dirty="0" smtClean="0"/>
-              <a:t>Lacking multiple waypoint considerations.</a:t>
-            </a:r>
-          </a:p>
-          <a:p>
-            <a:pPr lvl="1">
+              <a:t>2D prediction model with Rate of Turn Constraints at cruise velocity.</a:t>
+            </a:r>
+          </a:p>
+          <a:p>
+            <a:pPr>
               <a:buClr>
                 <a:srgbClr val="0070C0"/>
               </a:buClr>
               <a:buFont typeface="Wingdings" pitchFamily="2" charset="2"/>
-              <a:buChar char="Ø"/>
-            </a:pPr>
-            <a:r>
-              <a:rPr lang="en-AU" dirty="0" smtClean="0"/>
-              <a:t>2D prediction model with Rate of Turn Constraints at cruise velocity.</a:t>
-            </a:r>
-          </a:p>
-          <a:p>
-            <a:pPr lvl="1">
-              <a:buClr>
-                <a:srgbClr val="0070C0"/>
-              </a:buClr>
-              <a:buFont typeface="Wingdings" pitchFamily="2" charset="2"/>
-              <a:buChar char="Ø"/>
+              <a:buChar char="q"/>
             </a:pPr>
             <a:r>
               <a:rPr lang="en-AU" dirty="0" smtClean="0"/>
@@ -7098,8 +7069,8 @@
         </p:blipFill>
         <p:spPr>
           <a:xfrm>
-            <a:off x="1142976" y="1214422"/>
-            <a:ext cx="6707896" cy="5181315"/>
+            <a:off x="1071538" y="1071546"/>
+            <a:ext cx="6779334" cy="5236495"/>
           </a:xfrm>
           <a:prstGeom prst="rect">
             <a:avLst/>
@@ -7180,8 +7151,8 @@
         </p:blipFill>
         <p:spPr>
           <a:xfrm>
-            <a:off x="1071538" y="1357298"/>
-            <a:ext cx="7215238" cy="4143404"/>
+            <a:off x="428596" y="1357298"/>
+            <a:ext cx="8334844" cy="4786346"/>
           </a:xfrm>
         </p:spPr>
       </p:pic>
@@ -7281,7 +7252,7 @@
           <a:p>
             <a:r>
               <a:rPr lang="en-AU" sz="3600" b="0" u="none" dirty="0" smtClean="0"/>
-              <a:t>Six Degree of Freedom Model</a:t>
+              <a:t>6 DOF Vehicle Dynamics Model</a:t>
             </a:r>
             <a:endParaRPr lang="en-AU" sz="3600" b="0" u="none" dirty="0"/>
           </a:p>
@@ -7319,7 +7290,7 @@
             </a:r>
             <a:r>
               <a:rPr lang="en-AU" sz="2000" dirty="0" smtClean="0"/>
-              <a:t> Autopilot</a:t>
+              <a:t> Autopilot.</a:t>
             </a:r>
           </a:p>
           <a:p>
@@ -7358,7 +7329,10 @@
               <a:rPr lang="en-AU" sz="2000" dirty="0" err="1" smtClean="0"/>
               <a:t>Blockset</a:t>
             </a:r>
-            <a:endParaRPr lang="en-AU" sz="2000" dirty="0" smtClean="0"/>
+            <a:r>
+              <a:rPr lang="en-AU" sz="2000" dirty="0" smtClean="0"/>
+              <a:t>.</a:t>
+            </a:r>
           </a:p>
           <a:p>
             <a:pPr>
@@ -7370,7 +7344,7 @@
             </a:pPr>
             <a:r>
               <a:rPr lang="en-AU" sz="2000" dirty="0" smtClean="0"/>
-              <a:t>Capable of prediction of a UAS in with waypoint navigation and attitude considerations</a:t>
+              <a:t>Capable of prediction of a UAS in with waypoint navigation and attitude considerations.</a:t>
             </a:r>
           </a:p>
           <a:p>
@@ -7404,7 +7378,7 @@
             </a:r>
             <a:r>
               <a:rPr lang="en-AU" sz="2000" dirty="0" err="1" smtClean="0"/>
-              <a:t>JBSim</a:t>
+              <a:t>JSBSim</a:t>
             </a:r>
             <a:r>
               <a:rPr lang="en-AU" sz="2000" dirty="0" smtClean="0"/>
@@ -7721,6 +7695,34 @@
           </a:fontRef>
         </p:style>
       </p:cxnSp>
+      <p:sp>
+        <p:nvSpPr>
+          <p:cNvPr id="9" name="Footer Placeholder 3"/>
+          <p:cNvSpPr>
+            <a:spLocks noGrp="1"/>
+          </p:cNvSpPr>
+          <p:nvPr>
+            <p:ph type="ftr" sz="quarter" idx="11"/>
+          </p:nvPr>
+        </p:nvSpPr>
+        <p:spPr>
+          <a:xfrm>
+            <a:off x="3124200" y="6381750"/>
+            <a:ext cx="2895600" cy="339725"/>
+          </a:xfrm>
+        </p:spPr>
+        <p:txBody>
+          <a:bodyPr/>
+          <a:lstStyle/>
+          <a:p>
+            <a:r>
+              <a:rPr lang="en-AU" dirty="0" smtClean="0"/>
+              <a:t>Nicholas Rutherford</a:t>
+            </a:r>
+            <a:endParaRPr lang="en-AU" dirty="0"/>
+          </a:p>
+        </p:txBody>
+      </p:sp>
     </p:spTree>
   </p:cSld>
   <p:clrMapOvr>
@@ -7904,7 +7906,6 @@
               <a:rPr lang="en-AU" sz="3600" b="0" u="none" dirty="0" smtClean="0"/>
               <a:t>System Logs</a:t>
             </a:r>
-            <a:endParaRPr lang="en-AU" sz="3600" b="0" u="none" dirty="0" smtClean="0"/>
           </a:p>
         </p:txBody>
       </p:sp>
@@ -8019,7 +8020,7 @@
         </p:blipFill>
         <p:spPr>
           <a:xfrm>
-            <a:off x="2143108" y="3643314"/>
+            <a:off x="2285984" y="3714752"/>
             <a:ext cx="4357686" cy="2501130"/>
           </a:xfrm>
           <a:prstGeom prst="rect">
@@ -8027,11 +8028,108 @@
           </a:prstGeom>
         </p:spPr>
       </p:pic>
+      <p:sp>
+        <p:nvSpPr>
+          <p:cNvPr id="10" name="TextBox 9"/>
+          <p:cNvSpPr txBox="1"/>
+          <p:nvPr/>
+        </p:nvSpPr>
+        <p:spPr>
+          <a:xfrm>
+            <a:off x="1500166" y="3429000"/>
+            <a:ext cx="2428892" cy="276999"/>
+          </a:xfrm>
+          <a:prstGeom prst="rect">
+            <a:avLst/>
+          </a:prstGeom>
+          <a:noFill/>
+        </p:spPr>
+        <p:txBody>
+          <a:bodyPr wrap="square" rtlCol="0">
+            <a:spAutoFit/>
+          </a:bodyPr>
+          <a:lstStyle/>
+          <a:p>
+            <a:r>
+              <a:rPr lang="en-AU" sz="1200" i="1" dirty="0" smtClean="0"/>
+              <a:t>Control Inputs</a:t>
+            </a:r>
+            <a:endParaRPr lang="en-AU" sz="1200" i="1" dirty="0"/>
+          </a:p>
+        </p:txBody>
+      </p:sp>
+      <p:sp>
+        <p:nvSpPr>
+          <p:cNvPr id="11" name="TextBox 10"/>
+          <p:cNvSpPr txBox="1"/>
+          <p:nvPr/>
+        </p:nvSpPr>
+        <p:spPr>
+          <a:xfrm>
+            <a:off x="3786182" y="6000768"/>
+            <a:ext cx="2428892" cy="276999"/>
+          </a:xfrm>
+          <a:prstGeom prst="rect">
+            <a:avLst/>
+          </a:prstGeom>
+          <a:noFill/>
+        </p:spPr>
+        <p:txBody>
+          <a:bodyPr wrap="square" rtlCol="0">
+            <a:spAutoFit/>
+          </a:bodyPr>
+          <a:lstStyle/>
+          <a:p>
+            <a:r>
+              <a:rPr lang="en-AU" sz="1200" i="1" dirty="0" smtClean="0"/>
+              <a:t>Flight Dynamics</a:t>
+            </a:r>
+            <a:endParaRPr lang="en-AU" sz="1200" i="1" dirty="0"/>
+          </a:p>
+        </p:txBody>
+      </p:sp>
+      <p:sp>
+        <p:nvSpPr>
+          <p:cNvPr id="12" name="TextBox 11"/>
+          <p:cNvSpPr txBox="1"/>
+          <p:nvPr/>
+        </p:nvSpPr>
+        <p:spPr>
+          <a:xfrm>
+            <a:off x="6143636" y="3429000"/>
+            <a:ext cx="2428892" cy="276999"/>
+          </a:xfrm>
+          <a:prstGeom prst="rect">
+            <a:avLst/>
+          </a:prstGeom>
+          <a:noFill/>
+        </p:spPr>
+        <p:txBody>
+          <a:bodyPr wrap="square" rtlCol="0">
+            <a:spAutoFit/>
+          </a:bodyPr>
+          <a:lstStyle/>
+          <a:p>
+            <a:r>
+              <a:rPr lang="en-AU" sz="1200" i="1" dirty="0" smtClean="0"/>
+              <a:t>Euler Angles</a:t>
+            </a:r>
+            <a:endParaRPr lang="en-AU" sz="1200" i="1" dirty="0"/>
+          </a:p>
+        </p:txBody>
+      </p:sp>
     </p:spTree>
   </p:cSld>
   <p:clrMapOvr>
     <a:masterClrMapping/>
   </p:clrMapOvr>
+  <p:timing>
+    <p:tnLst>
+      <p:par>
+        <p:cTn id="1" dur="indefinite" restart="never" nodeType="tmRoot"/>
+      </p:par>
+    </p:tnLst>
+  </p:timing>
 </p:sld>
 </file>
 
@@ -8114,15 +8212,7 @@
             </a:pPr>
             <a:r>
               <a:rPr lang="en-AU" dirty="0" smtClean="0"/>
-              <a:t>Not </a:t>
-            </a:r>
-            <a:r>
-              <a:rPr lang="en-AU" dirty="0" smtClean="0"/>
-              <a:t>official testing conditions</a:t>
-            </a:r>
-            <a:r>
-              <a:rPr lang="en-AU" dirty="0" smtClean="0"/>
-              <a:t>.</a:t>
+              <a:t>Not official testing conditions.</a:t>
             </a:r>
           </a:p>
           <a:p>
@@ -8150,7 +8240,6 @@
               <a:rPr lang="en-AU" dirty="0" smtClean="0"/>
               <a:t>Capture and compare standard telemetry.</a:t>
             </a:r>
-            <a:endParaRPr lang="en-AU" dirty="0" smtClean="0"/>
           </a:p>
         </p:txBody>
       </p:sp>
@@ -8274,7 +8363,7 @@
           <a:p>
             <a:r>
               <a:rPr lang="en-AU" sz="3600" b="0" u="none" dirty="0" smtClean="0"/>
-              <a:t>Project Future and Final Notes</a:t>
+              <a:t>Project Status</a:t>
             </a:r>
             <a:endParaRPr lang="en-AU" sz="3600" b="0" u="none" dirty="0"/>
           </a:p>
@@ -8304,7 +8393,64 @@
             </a:pPr>
             <a:r>
               <a:rPr lang="en-AU" sz="2400" dirty="0" smtClean="0"/>
-              <a:t>Final Key Points of interest	</a:t>
+              <a:t>Current Progress</a:t>
+            </a:r>
+          </a:p>
+          <a:p>
+            <a:pPr marL="742950" lvl="2" indent="-342900">
+              <a:buClr>
+                <a:srgbClr val="0070C0"/>
+              </a:buClr>
+              <a:buFont typeface="Wingdings" pitchFamily="2" charset="2"/>
+              <a:buChar char="ü"/>
+            </a:pPr>
+            <a:r>
+              <a:rPr lang="en-AU" sz="2000" dirty="0" smtClean="0"/>
+              <a:t>HLO-1: Literature survey completed.</a:t>
+            </a:r>
+          </a:p>
+          <a:p>
+            <a:pPr marL="742950" lvl="2" indent="-342900">
+              <a:buClr>
+                <a:srgbClr val="0070C0"/>
+              </a:buClr>
+              <a:buFont typeface="Wingdings" pitchFamily="2" charset="2"/>
+              <a:buChar char="ü"/>
+            </a:pPr>
+            <a:r>
+              <a:rPr lang="en-AU" sz="2000" dirty="0" smtClean="0"/>
+              <a:t>HLO-2: Development of a 2D and 3D PFMS model capable of predicting the location of the UAS in a finite horizon.</a:t>
+            </a:r>
+          </a:p>
+          <a:p>
+            <a:pPr marL="1200150" lvl="3" indent="-342900">
+              <a:buClr>
+                <a:srgbClr val="0070C0"/>
+              </a:buClr>
+              <a:buFont typeface="Wingdings" pitchFamily="2" charset="2"/>
+              <a:buChar char="§"/>
+            </a:pPr>
+            <a:r>
+              <a:rPr lang="en-AU" dirty="0" smtClean="0"/>
+              <a:t>Model still requires </a:t>
+            </a:r>
+            <a:r>
+              <a:rPr lang="en-AU" dirty="0" smtClean="0"/>
+              <a:t>validation using telemetry.</a:t>
+            </a:r>
+            <a:endParaRPr lang="en-AU" dirty="0" smtClean="0"/>
+          </a:p>
+          <a:p>
+            <a:pPr>
+              <a:buClr>
+                <a:srgbClr val="0070C0"/>
+              </a:buClr>
+              <a:buFont typeface="Wingdings" pitchFamily="2" charset="2"/>
+              <a:buChar char="q"/>
+            </a:pPr>
+            <a:r>
+              <a:rPr lang="en-AU" sz="2400" dirty="0" smtClean="0"/>
+              <a:t>Future</a:t>
             </a:r>
           </a:p>
           <a:p>
@@ -8317,7 +8463,7 @@
             </a:pPr>
             <a:r>
               <a:rPr lang="en-AU" sz="2000" dirty="0" smtClean="0"/>
-              <a:t>Processing capability.</a:t>
+              <a:t>Validation using standard telemetry and subsequent system optimisation.</a:t>
             </a:r>
           </a:p>
           <a:p>
@@ -8330,71 +8476,7 @@
             </a:pPr>
             <a:r>
               <a:rPr lang="en-AU" sz="2000" dirty="0" smtClean="0"/>
-              <a:t>Other PFMS applications.</a:t>
-            </a:r>
-          </a:p>
-          <a:p>
-            <a:pPr>
-              <a:buClr>
-                <a:srgbClr val="0070C0"/>
-              </a:buClr>
-              <a:buFont typeface="Wingdings" pitchFamily="2" charset="2"/>
-              <a:buChar char="q"/>
-            </a:pPr>
-            <a:r>
-              <a:rPr lang="en-AU" sz="2400" dirty="0" smtClean="0"/>
-              <a:t>Project future</a:t>
-            </a:r>
-          </a:p>
-          <a:p>
-            <a:pPr lvl="1">
-              <a:buClr>
-                <a:srgbClr val="0070C0"/>
-              </a:buClr>
-              <a:buFont typeface="Wingdings" pitchFamily="2" charset="2"/>
-              <a:buChar char="Ø"/>
-            </a:pPr>
-            <a:r>
-              <a:rPr lang="en-AU" sz="2000" dirty="0" smtClean="0"/>
-              <a:t>Implementation onboard a UAS and testing and validation using standard telemetry.</a:t>
-            </a:r>
-          </a:p>
-          <a:p>
-            <a:pPr lvl="1">
-              <a:buClr>
-                <a:srgbClr val="0070C0"/>
-              </a:buClr>
-              <a:buFont typeface="Wingdings" pitchFamily="2" charset="2"/>
-              <a:buChar char="Ø"/>
-            </a:pPr>
-            <a:r>
-              <a:rPr lang="en-AU" sz="2000" dirty="0" smtClean="0"/>
-              <a:t>Required implementation in C++. </a:t>
-            </a:r>
-          </a:p>
-          <a:p>
-            <a:pPr lvl="2">
-              <a:buClr>
-                <a:srgbClr val="0070C0"/>
-              </a:buClr>
-              <a:buFont typeface="Courier New" pitchFamily="49" charset="0"/>
-              <a:buChar char="o"/>
-            </a:pPr>
-            <a:r>
-              <a:rPr lang="en-AU" sz="1800" dirty="0" err="1" smtClean="0"/>
-              <a:t>Matlab</a:t>
-            </a:r>
-            <a:r>
-              <a:rPr lang="en-AU" sz="1800" dirty="0" smtClean="0"/>
-              <a:t> Real Time Workshop for building </a:t>
-            </a:r>
-            <a:r>
-              <a:rPr lang="en-AU" sz="1800" dirty="0" err="1" smtClean="0"/>
-              <a:t>Simulink</a:t>
-            </a:r>
-            <a:r>
-              <a:rPr lang="en-AU" sz="1800" dirty="0" smtClean="0"/>
-              <a:t> Model.</a:t>
+              <a:t>Implementation onboard a UAS in C++.</a:t>
             </a:r>
           </a:p>
           <a:p>
@@ -8530,11 +8612,7 @@
           <a:p>
             <a:r>
               <a:rPr lang="en-AU" sz="4000" b="0" u="none" dirty="0" smtClean="0"/>
-              <a:t>QUT UAS </a:t>
-            </a:r>
-            <a:r>
-              <a:rPr lang="en-AU" sz="4000" b="0" u="none" dirty="0" smtClean="0"/>
-              <a:t>Team</a:t>
+              <a:t>QUT UAS Team</a:t>
             </a:r>
           </a:p>
         </p:txBody>
@@ -9443,6 +9521,19 @@
             </a:r>
           </a:p>
           <a:p>
+            <a:pPr marL="800100" lvl="1" indent="-342900">
+              <a:buClr>
+                <a:srgbClr val="0070C0"/>
+              </a:buClr>
+              <a:buFont typeface="Wingdings" pitchFamily="2" charset="2"/>
+              <a:buChar char="Ø"/>
+            </a:pPr>
+            <a:r>
+              <a:rPr lang="en-AU" sz="1800" dirty="0" smtClean="0"/>
+              <a:t>System Architecture</a:t>
+            </a:r>
+          </a:p>
+          <a:p>
             <a:pPr>
               <a:buClr>
                 <a:srgbClr val="0070C0"/>
@@ -9491,7 +9582,7 @@
             </a:pPr>
             <a:r>
               <a:rPr lang="en-AU" sz="1800" dirty="0" smtClean="0"/>
-              <a:t>Model Comparison and Validation</a:t>
+              <a:t>System Validation</a:t>
             </a:r>
           </a:p>
           <a:p>
@@ -9504,7 +9595,7 @@
             </a:pPr>
             <a:r>
               <a:rPr lang="en-AU" sz="1800" dirty="0" smtClean="0"/>
-              <a:t>Project Future and Final Key Notes</a:t>
+              <a:t>Project Status</a:t>
             </a:r>
           </a:p>
           <a:p>
@@ -9617,181 +9708,6 @@
 </p:sld>
 </file>
 
-<file path=ppt/slides/slide21.xml><?xml version="1.0" encoding="utf-8"?>
-<p:sld xmlns:a="http://schemas.openxmlformats.org/drawingml/2006/main" xmlns:r="http://schemas.openxmlformats.org/officeDocument/2006/relationships" xmlns:p="http://schemas.openxmlformats.org/presentationml/2006/main">
-  <p:cSld>
-    <p:spTree>
-      <p:nvGrpSpPr>
-        <p:cNvPr id="1" name=""/>
-        <p:cNvGrpSpPr/>
-        <p:nvPr/>
-      </p:nvGrpSpPr>
-      <p:grpSpPr>
-        <a:xfrm>
-          <a:off x="0" y="0"/>
-          <a:ext cx="0" cy="0"/>
-          <a:chOff x="0" y="0"/>
-          <a:chExt cx="0" cy="0"/>
-        </a:xfrm>
-      </p:grpSpPr>
-      <p:sp>
-        <p:nvSpPr>
-          <p:cNvPr id="4" name="Footer Placeholder 3"/>
-          <p:cNvSpPr>
-            <a:spLocks noGrp="1"/>
-          </p:cNvSpPr>
-          <p:nvPr>
-            <p:ph type="ftr" sz="quarter" idx="11"/>
-          </p:nvPr>
-        </p:nvSpPr>
-        <p:spPr/>
-        <p:txBody>
-          <a:bodyPr/>
-          <a:lstStyle/>
-          <a:p>
-            <a:r>
-              <a:rPr lang="en-AU" smtClean="0"/>
-              <a:t>Commercial-in-Confidence</a:t>
-            </a:r>
-            <a:br>
-              <a:rPr lang="en-AU" smtClean="0"/>
-            </a:br>
-            <a:r>
-              <a:rPr lang="en-AU" smtClean="0"/>
-              <a:t>Do not distribute</a:t>
-            </a:r>
-            <a:endParaRPr lang="en-AU"/>
-          </a:p>
-        </p:txBody>
-      </p:sp>
-      <p:sp>
-        <p:nvSpPr>
-          <p:cNvPr id="5" name="Slide Number Placeholder 4"/>
-          <p:cNvSpPr>
-            <a:spLocks noGrp="1"/>
-          </p:cNvSpPr>
-          <p:nvPr>
-            <p:ph type="sldNum" sz="quarter" idx="12"/>
-          </p:nvPr>
-        </p:nvSpPr>
-        <p:spPr/>
-        <p:txBody>
-          <a:bodyPr/>
-          <a:lstStyle/>
-          <a:p>
-            <a:fld id="{67E377A3-AA8F-49BD-B6AB-3E7FC26AB1DC}" type="slidenum">
-              <a:rPr lang="en-AU" smtClean="0"/>
-              <a:pPr/>
-              <a:t>21</a:t>
-            </a:fld>
-            <a:endParaRPr lang="en-AU"/>
-          </a:p>
-        </p:txBody>
-      </p:sp>
-      <p:pic>
-        <p:nvPicPr>
-          <p:cNvPr id="6" name="Picture 2"/>
-          <p:cNvPicPr>
-            <a:picLocks noGrp="1" noChangeAspect="1" noChangeArrowheads="1"/>
-          </p:cNvPicPr>
-          <p:nvPr>
-            <p:ph idx="1"/>
-          </p:nvPr>
-        </p:nvPicPr>
-        <p:blipFill>
-          <a:blip r:embed="rId2"/>
-          <a:srcRect/>
-          <a:stretch>
-            <a:fillRect/>
-          </a:stretch>
-        </p:blipFill>
-        <p:spPr bwMode="auto">
-          <a:xfrm>
-            <a:off x="428596" y="3286124"/>
-            <a:ext cx="5305425" cy="1171575"/>
-          </a:xfrm>
-          <a:prstGeom prst="rect">
-            <a:avLst/>
-          </a:prstGeom>
-          <a:noFill/>
-          <a:ln w="9525">
-            <a:noFill/>
-            <a:miter lim="800000"/>
-            <a:headEnd/>
-            <a:tailEnd/>
-          </a:ln>
-          <a:effectLst/>
-        </p:spPr>
-      </p:pic>
-      <p:sp>
-        <p:nvSpPr>
-          <p:cNvPr id="7" name="Rectangle 6"/>
-          <p:cNvSpPr/>
-          <p:nvPr/>
-        </p:nvSpPr>
-        <p:spPr>
-          <a:xfrm>
-            <a:off x="2286000" y="2890391"/>
-            <a:ext cx="4572000" cy="1077218"/>
-          </a:xfrm>
-          <a:prstGeom prst="rect">
-            <a:avLst/>
-          </a:prstGeom>
-        </p:spPr>
-        <p:txBody>
-          <a:bodyPr>
-            <a:spAutoFit/>
-          </a:bodyPr>
-          <a:lstStyle/>
-          <a:p>
-            <a:pPr>
-              <a:buClr>
-                <a:srgbClr val="0070C0"/>
-              </a:buClr>
-              <a:buFont typeface="Wingdings" pitchFamily="2" charset="2"/>
-              <a:buChar char="q"/>
-            </a:pPr>
-            <a:r>
-              <a:rPr lang="en-AU" sz="2400" dirty="0" smtClean="0"/>
-              <a:t>Issues</a:t>
-            </a:r>
-          </a:p>
-          <a:p>
-            <a:pPr lvl="1">
-              <a:buClr>
-                <a:srgbClr val="0070C0"/>
-              </a:buClr>
-              <a:buFont typeface="Wingdings" pitchFamily="2" charset="2"/>
-              <a:buChar char="Ø"/>
-            </a:pPr>
-            <a:r>
-              <a:rPr lang="en-AU" sz="2000" dirty="0" smtClean="0"/>
-              <a:t> mention window of control</a:t>
-            </a:r>
-          </a:p>
-          <a:p>
-            <a:pPr lvl="1">
-              <a:buClr>
-                <a:srgbClr val="0070C0"/>
-              </a:buClr>
-              <a:buFont typeface="Wingdings" pitchFamily="2" charset="2"/>
-              <a:buChar char="Ø"/>
-            </a:pPr>
-            <a:r>
-              <a:rPr lang="en-AU" sz="2000" dirty="0" smtClean="0"/>
-              <a:t>Modify Wind</a:t>
-            </a:r>
-          </a:p>
-        </p:txBody>
-      </p:sp>
-    </p:spTree>
-  </p:cSld>
-  <p:clrMapOvr>
-    <a:masterClrMapping/>
-  </p:clrMapOvr>
-</p:sld>
-</file>
-
 <file path=ppt/slides/slide3.xml><?xml version="1.0" encoding="utf-8"?>
 <p:sld xmlns:a="http://schemas.openxmlformats.org/drawingml/2006/main" xmlns:r="http://schemas.openxmlformats.org/officeDocument/2006/relationships" xmlns:p="http://schemas.openxmlformats.org/presentationml/2006/main">
   <p:cSld>
@@ -10046,6 +9962,19 @@
             </a:r>
           </a:p>
           <a:p>
+            <a:pPr marL="800100" lvl="1" indent="-342900">
+              <a:buClr>
+                <a:srgbClr val="0070C0"/>
+              </a:buClr>
+              <a:buFont typeface="Wingdings" pitchFamily="2" charset="2"/>
+              <a:buChar char="Ø"/>
+            </a:pPr>
+            <a:r>
+              <a:rPr lang="en-AU" sz="1800" dirty="0" smtClean="0"/>
+              <a:t>System Architecture</a:t>
+            </a:r>
+          </a:p>
+          <a:p>
             <a:pPr>
               <a:buClr>
                 <a:srgbClr val="0070C0"/>
@@ -10094,7 +10023,7 @@
             </a:pPr>
             <a:r>
               <a:rPr lang="en-AU" sz="1800" dirty="0" smtClean="0"/>
-              <a:t>Model Comparison and Validation</a:t>
+              <a:t>System Validation</a:t>
             </a:r>
           </a:p>
           <a:p>
@@ -10107,7 +10036,7 @@
             </a:pPr>
             <a:r>
               <a:rPr lang="en-AU" sz="1800" dirty="0" smtClean="0"/>
-              <a:t>Project Future and Final Key Notes</a:t>
+              <a:t>Project Status</a:t>
             </a:r>
           </a:p>
           <a:p>
@@ -10403,7 +10332,7 @@
                 <a:ea typeface="+mn-ea"/>
                 <a:cs typeface="+mn-cs"/>
               </a:rPr>
-              <a:t>the effect of successive waypoints on flight trajectory.</a:t>
+              <a:t>the effect of successive waypoints on a flight trajectory.</a:t>
             </a:r>
           </a:p>
           <a:p>
@@ -10511,9 +10440,12 @@
           <a:bodyPr/>
           <a:lstStyle/>
           <a:p>
-            <a:r>
-              <a:rPr lang="en-AU" sz="4000" b="0" u="none" dirty="0" smtClean="0"/>
-              <a:t>PFMS Concept</a:t>
+            <a:pPr lvl="0">
+              <a:defRPr/>
+            </a:pPr>
+            <a:r>
+              <a:rPr lang="en-AU" sz="4000" b="0" u="none" dirty="0"/>
+              <a:t>Project High Level Objectives</a:t>
             </a:r>
             <a:endParaRPr lang="en-AU" sz="4000" dirty="0"/>
           </a:p>
@@ -10561,111 +10493,6 @@
               <a:rPr lang="en-AU" smtClean="0"/>
               <a:pPr/>
               <a:t>6</a:t>
-            </a:fld>
-            <a:endParaRPr lang="en-AU"/>
-          </a:p>
-        </p:txBody>
-      </p:sp>
-    </p:spTree>
-  </p:cSld>
-  <p:clrMapOvr>
-    <a:masterClrMapping/>
-  </p:clrMapOvr>
-  <p:timing>
-    <p:tnLst>
-      <p:par>
-        <p:cTn id="1" dur="indefinite" restart="never" nodeType="tmRoot"/>
-      </p:par>
-    </p:tnLst>
-  </p:timing>
-</p:sld>
-</file>
-
-<file path=ppt/slides/slide7.xml><?xml version="1.0" encoding="utf-8"?>
-<p:sld xmlns:a="http://schemas.openxmlformats.org/drawingml/2006/main" xmlns:r="http://schemas.openxmlformats.org/officeDocument/2006/relationships" xmlns:p="http://schemas.openxmlformats.org/presentationml/2006/main">
-  <p:cSld>
-    <p:spTree>
-      <p:nvGrpSpPr>
-        <p:cNvPr id="1" name=""/>
-        <p:cNvGrpSpPr/>
-        <p:nvPr/>
-      </p:nvGrpSpPr>
-      <p:grpSpPr>
-        <a:xfrm>
-          <a:off x="0" y="0"/>
-          <a:ext cx="0" cy="0"/>
-          <a:chOff x="0" y="0"/>
-          <a:chExt cx="0" cy="0"/>
-        </a:xfrm>
-      </p:grpSpPr>
-      <p:sp>
-        <p:nvSpPr>
-          <p:cNvPr id="2" name="Title 1"/>
-          <p:cNvSpPr>
-            <a:spLocks noGrp="1"/>
-          </p:cNvSpPr>
-          <p:nvPr>
-            <p:ph type="title"/>
-          </p:nvPr>
-        </p:nvSpPr>
-        <p:spPr/>
-        <p:txBody>
-          <a:bodyPr/>
-          <a:lstStyle/>
-          <a:p>
-            <a:pPr lvl="0">
-              <a:defRPr/>
-            </a:pPr>
-            <a:r>
-              <a:rPr lang="en-AU" sz="4000" b="0" u="none" dirty="0"/>
-              <a:t>Project High Level Objectives</a:t>
-            </a:r>
-            <a:endParaRPr lang="en-AU" sz="4000" dirty="0"/>
-          </a:p>
-        </p:txBody>
-      </p:sp>
-      <p:sp>
-        <p:nvSpPr>
-          <p:cNvPr id="4" name="Footer Placeholder 3"/>
-          <p:cNvSpPr>
-            <a:spLocks noGrp="1"/>
-          </p:cNvSpPr>
-          <p:nvPr>
-            <p:ph type="ftr" sz="quarter" idx="11"/>
-          </p:nvPr>
-        </p:nvSpPr>
-        <p:spPr/>
-        <p:txBody>
-          <a:bodyPr/>
-          <a:lstStyle/>
-          <a:p>
-            <a:r>
-              <a:rPr lang="en-AU" dirty="0" smtClean="0"/>
-              <a:t>Nicholas Rutherford</a:t>
-            </a:r>
-            <a:endParaRPr lang="en-AU" dirty="0"/>
-          </a:p>
-        </p:txBody>
-      </p:sp>
-      <p:sp>
-        <p:nvSpPr>
-          <p:cNvPr id="5" name="Slide Number Placeholder 4"/>
-          <p:cNvSpPr>
-            <a:spLocks noGrp="1"/>
-          </p:cNvSpPr>
-          <p:nvPr>
-            <p:ph type="sldNum" sz="quarter" idx="12"/>
-          </p:nvPr>
-        </p:nvSpPr>
-        <p:spPr/>
-        <p:txBody>
-          <a:bodyPr/>
-          <a:lstStyle/>
-          <a:p>
-            <a:fld id="{67E377A3-AA8F-49BD-B6AB-3E7FC26AB1DC}" type="slidenum">
-              <a:rPr lang="en-AU" smtClean="0"/>
-              <a:pPr/>
-              <a:t>7</a:t>
             </a:fld>
             <a:endParaRPr lang="en-AU"/>
           </a:p>
@@ -10740,7 +10567,7 @@
 </p:sld>
 </file>
 
-<file path=ppt/slides/slide8.xml><?xml version="1.0" encoding="utf-8"?>
+<file path=ppt/slides/slide7.xml><?xml version="1.0" encoding="utf-8"?>
 <p:sld xmlns:a="http://schemas.openxmlformats.org/drawingml/2006/main" xmlns:r="http://schemas.openxmlformats.org/officeDocument/2006/relationships" xmlns:p="http://schemas.openxmlformats.org/presentationml/2006/main" showMasterSp="0">
   <p:cSld>
     <p:spTree>
@@ -10884,6 +10711,165 @@
 </p:sld>
 </file>
 
+<file path=ppt/slides/slide8.xml><?xml version="1.0" encoding="utf-8"?>
+<p:sld xmlns:a="http://schemas.openxmlformats.org/drawingml/2006/main" xmlns:r="http://schemas.openxmlformats.org/officeDocument/2006/relationships" xmlns:p="http://schemas.openxmlformats.org/presentationml/2006/main">
+  <p:cSld>
+    <p:spTree>
+      <p:nvGrpSpPr>
+        <p:cNvPr id="1" name=""/>
+        <p:cNvGrpSpPr/>
+        <p:nvPr/>
+      </p:nvGrpSpPr>
+      <p:grpSpPr>
+        <a:xfrm>
+          <a:off x="0" y="0"/>
+          <a:ext cx="0" cy="0"/>
+          <a:chOff x="0" y="0"/>
+          <a:chExt cx="0" cy="0"/>
+        </a:xfrm>
+      </p:grpSpPr>
+      <p:sp>
+        <p:nvSpPr>
+          <p:cNvPr id="2" name="Title 1"/>
+          <p:cNvSpPr>
+            <a:spLocks noGrp="1"/>
+          </p:cNvSpPr>
+          <p:nvPr>
+            <p:ph type="title"/>
+          </p:nvPr>
+        </p:nvSpPr>
+        <p:spPr/>
+        <p:txBody>
+          <a:bodyPr/>
+          <a:lstStyle/>
+          <a:p>
+            <a:r>
+              <a:rPr lang="en-AU" sz="4600" b="0" u="none" dirty="0" smtClean="0"/>
+              <a:t>Project Schedule</a:t>
+            </a:r>
+            <a:endParaRPr lang="en-AU" sz="4600" dirty="0"/>
+          </a:p>
+        </p:txBody>
+      </p:sp>
+      <p:sp>
+        <p:nvSpPr>
+          <p:cNvPr id="4" name="Footer Placeholder 3"/>
+          <p:cNvSpPr>
+            <a:spLocks noGrp="1"/>
+          </p:cNvSpPr>
+          <p:nvPr>
+            <p:ph type="ftr" sz="quarter" idx="11"/>
+          </p:nvPr>
+        </p:nvSpPr>
+        <p:spPr/>
+        <p:txBody>
+          <a:bodyPr/>
+          <a:lstStyle/>
+          <a:p>
+            <a:r>
+              <a:rPr lang="en-AU" dirty="0" smtClean="0"/>
+              <a:t>Nicholas Rutherford</a:t>
+            </a:r>
+            <a:endParaRPr lang="en-AU" dirty="0"/>
+          </a:p>
+        </p:txBody>
+      </p:sp>
+      <p:sp>
+        <p:nvSpPr>
+          <p:cNvPr id="5" name="Slide Number Placeholder 4"/>
+          <p:cNvSpPr>
+            <a:spLocks noGrp="1"/>
+          </p:cNvSpPr>
+          <p:nvPr>
+            <p:ph type="sldNum" sz="quarter" idx="12"/>
+          </p:nvPr>
+        </p:nvSpPr>
+        <p:spPr/>
+        <p:txBody>
+          <a:bodyPr/>
+          <a:lstStyle/>
+          <a:p>
+            <a:fld id="{67E377A3-AA8F-49BD-B6AB-3E7FC26AB1DC}" type="slidenum">
+              <a:rPr lang="en-AU" smtClean="0"/>
+              <a:pPr/>
+              <a:t>8</a:t>
+            </a:fld>
+            <a:endParaRPr lang="en-AU"/>
+          </a:p>
+        </p:txBody>
+      </p:sp>
+      <p:pic>
+        <p:nvPicPr>
+          <p:cNvPr id="6" name="Picture 5" descr="PFMS Schedule.tif"/>
+          <p:cNvPicPr/>
+          <p:nvPr/>
+        </p:nvPicPr>
+        <p:blipFill>
+          <a:blip r:embed="rId2" cstate="print"/>
+          <a:srcRect l="2951" t="4151" r="2813" b="72349"/>
+          <a:stretch>
+            <a:fillRect/>
+          </a:stretch>
+        </p:blipFill>
+        <p:spPr>
+          <a:xfrm>
+            <a:off x="142844" y="2714620"/>
+            <a:ext cx="8858280" cy="2500330"/>
+          </a:xfrm>
+          <a:prstGeom prst="rect">
+            <a:avLst/>
+          </a:prstGeom>
+        </p:spPr>
+      </p:pic>
+      <p:sp>
+        <p:nvSpPr>
+          <p:cNvPr id="7" name="Content Placeholder 2"/>
+          <p:cNvSpPr>
+            <a:spLocks noGrp="1"/>
+          </p:cNvSpPr>
+          <p:nvPr>
+            <p:ph idx="1"/>
+          </p:nvPr>
+        </p:nvSpPr>
+        <p:spPr>
+          <a:xfrm>
+            <a:off x="323850" y="1268413"/>
+            <a:ext cx="8424863" cy="5040312"/>
+          </a:xfrm>
+        </p:spPr>
+        <p:txBody>
+          <a:bodyPr/>
+          <a:lstStyle/>
+          <a:p>
+            <a:pPr lvl="1">
+              <a:buClr>
+                <a:srgbClr val="0070C0"/>
+              </a:buClr>
+              <a:buFont typeface="Wingdings" pitchFamily="2" charset="2"/>
+              <a:buChar char="q"/>
+            </a:pPr>
+            <a:r>
+              <a:rPr lang="en-AU" dirty="0" smtClean="0"/>
+              <a:t>Schedule developed from work packages.</a:t>
+            </a:r>
+          </a:p>
+        </p:txBody>
+      </p:sp>
+    </p:spTree>
+  </p:cSld>
+  <p:clrMapOvr>
+    <a:masterClrMapping/>
+  </p:clrMapOvr>
+  <p:timing>
+    <p:tnLst>
+      <p:par>
+        <p:cTn id="1" dur="indefinite" restart="never" nodeType="tmRoot"/>
+      </p:par>
+    </p:tnLst>
+  </p:timing>
+</p:sld>
+</file>
+
 <file path=ppt/slides/slide9.xml><?xml version="1.0" encoding="utf-8"?>
 <p:sld xmlns:a="http://schemas.openxmlformats.org/drawingml/2006/main" xmlns:r="http://schemas.openxmlformats.org/officeDocument/2006/relationships" xmlns:p="http://schemas.openxmlformats.org/presentationml/2006/main">
   <p:cSld>
@@ -10917,10 +10903,127 @@
           <a:lstStyle/>
           <a:p>
             <a:r>
-              <a:rPr lang="en-AU" sz="4600" b="0" u="none" dirty="0" smtClean="0"/>
-              <a:t>Project Schedule</a:t>
-            </a:r>
-            <a:endParaRPr lang="en-AU" sz="4600" dirty="0"/>
+              <a:rPr lang="en-AU" sz="4000" b="0" u="none" dirty="0" smtClean="0"/>
+              <a:t>Project Budget &amp; Risks</a:t>
+            </a:r>
+            <a:endParaRPr lang="en-AU" sz="4000" b="0" u="none" dirty="0"/>
+          </a:p>
+        </p:txBody>
+      </p:sp>
+      <p:sp>
+        <p:nvSpPr>
+          <p:cNvPr id="3" name="Content Placeholder 2"/>
+          <p:cNvSpPr>
+            <a:spLocks noGrp="1"/>
+          </p:cNvSpPr>
+          <p:nvPr>
+            <p:ph idx="1"/>
+          </p:nvPr>
+        </p:nvSpPr>
+        <p:spPr/>
+        <p:txBody>
+          <a:bodyPr/>
+          <a:lstStyle/>
+          <a:p>
+            <a:pPr>
+              <a:buClr>
+                <a:srgbClr val="0070C0"/>
+              </a:buClr>
+              <a:buFont typeface="Wingdings" pitchFamily="2" charset="2"/>
+              <a:buChar char="q"/>
+            </a:pPr>
+            <a:r>
+              <a:rPr lang="en-AU" dirty="0" smtClean="0"/>
+              <a:t>Project Budget</a:t>
+            </a:r>
+          </a:p>
+          <a:p>
+            <a:pPr lvl="1">
+              <a:buClr>
+                <a:srgbClr val="0070C0"/>
+              </a:buClr>
+              <a:buFont typeface="Wingdings" pitchFamily="2" charset="2"/>
+              <a:buChar char="Ø"/>
+            </a:pPr>
+            <a:r>
+              <a:rPr lang="en-AU" dirty="0" smtClean="0"/>
+              <a:t>No incurred costs for software development.</a:t>
+            </a:r>
+          </a:p>
+          <a:p>
+            <a:pPr lvl="1">
+              <a:buClr>
+                <a:srgbClr val="0070C0"/>
+              </a:buClr>
+              <a:buFont typeface="Wingdings" pitchFamily="2" charset="2"/>
+              <a:buChar char="Ø"/>
+            </a:pPr>
+            <a:r>
+              <a:rPr lang="en-AU" dirty="0" smtClean="0"/>
+              <a:t>Future Costs will be covered by the QUAS project.</a:t>
+            </a:r>
+          </a:p>
+          <a:p>
+            <a:pPr>
+              <a:buClr>
+                <a:srgbClr val="0070C0"/>
+              </a:buClr>
+              <a:buFont typeface="Wingdings" pitchFamily="2" charset="2"/>
+              <a:buChar char="q"/>
+            </a:pPr>
+            <a:r>
+              <a:rPr lang="en-AU" dirty="0" smtClean="0"/>
+              <a:t>Project Risks</a:t>
+            </a:r>
+          </a:p>
+          <a:p>
+            <a:pPr lvl="1">
+              <a:buClr>
+                <a:srgbClr val="0070C0"/>
+              </a:buClr>
+              <a:buFont typeface="Wingdings" pitchFamily="2" charset="2"/>
+              <a:buChar char="Ø"/>
+            </a:pPr>
+            <a:r>
+              <a:rPr lang="en-AU" dirty="0" smtClean="0"/>
+              <a:t>Risk Management Plan.</a:t>
+            </a:r>
+          </a:p>
+          <a:p>
+            <a:pPr lvl="1">
+              <a:buClr>
+                <a:srgbClr val="0070C0"/>
+              </a:buClr>
+              <a:buFont typeface="Wingdings" pitchFamily="2" charset="2"/>
+              <a:buChar char="Ø"/>
+            </a:pPr>
+            <a:r>
+              <a:rPr lang="en-AU" dirty="0" smtClean="0"/>
+              <a:t>Single Working Engineer.</a:t>
+            </a:r>
+          </a:p>
+          <a:p>
+            <a:pPr lvl="1">
+              <a:buClr>
+                <a:srgbClr val="0070C0"/>
+              </a:buClr>
+              <a:buFont typeface="Wingdings" pitchFamily="2" charset="2"/>
+              <a:buChar char="Ø"/>
+            </a:pPr>
+            <a:r>
+              <a:rPr lang="en-AU" dirty="0" smtClean="0"/>
+              <a:t>Possible complex control methods and high level of coding proficiency.</a:t>
+            </a:r>
+          </a:p>
+          <a:p>
+            <a:pPr lvl="1">
+              <a:buClr>
+                <a:srgbClr val="0070C0"/>
+              </a:buClr>
+              <a:buFont typeface="Wingdings" pitchFamily="2" charset="2"/>
+              <a:buChar char="Ø"/>
+            </a:pPr>
+            <a:endParaRPr lang="en-AU" dirty="0" smtClean="0"/>
           </a:p>
         </p:txBody>
       </p:sp>
@@ -10971,29 +11074,6 @@
           </a:p>
         </p:txBody>
       </p:sp>
-      <p:pic>
-        <p:nvPicPr>
-          <p:cNvPr id="6" name="Picture 5" descr="PFMS Schedule.tif"/>
-          <p:cNvPicPr/>
-          <p:nvPr/>
-        </p:nvPicPr>
-        <p:blipFill>
-          <a:blip r:embed="rId2" cstate="print"/>
-          <a:srcRect l="2951" t="4151" r="2813" b="72349"/>
-          <a:stretch>
-            <a:fillRect/>
-          </a:stretch>
-        </p:blipFill>
-        <p:spPr>
-          <a:xfrm>
-            <a:off x="142844" y="2143116"/>
-            <a:ext cx="8858280" cy="2402699"/>
-          </a:xfrm>
-          <a:prstGeom prst="rect">
-            <a:avLst/>
-          </a:prstGeom>
-        </p:spPr>
-      </p:pic>
     </p:spTree>
   </p:cSld>
   <p:clrMapOvr>

</xml_diff>